<commit_message>
Removed quotations in PP
</commit_message>
<xml_diff>
--- a/PRESENTATION MATERIAL/TagUp Presentation.pptx
+++ b/PRESENTATION MATERIAL/TagUp Presentation.pptx
@@ -465,7 +465,7 @@
           <a:p>
             <a:fld id="{3453B918-D857-444D-9D36-BD202A5B3F3A}" type="datetimeFigureOut">
               <a:rPr lang="en-US" smtClean="0"/>
-              <a:t>1/25/2016</a:t>
+              <a:t>1/26/2016</a:t>
             </a:fld>
             <a:endParaRPr lang="en-US"/>
           </a:p>
@@ -789,7 +789,7 @@
           <a:p>
             <a:fld id="{3453B918-D857-444D-9D36-BD202A5B3F3A}" type="datetimeFigureOut">
               <a:rPr lang="en-US" smtClean="0"/>
-              <a:t>1/25/2016</a:t>
+              <a:t>1/26/2016</a:t>
             </a:fld>
             <a:endParaRPr lang="en-US"/>
           </a:p>
@@ -1037,7 +1037,7 @@
           <a:p>
             <a:fld id="{3453B918-D857-444D-9D36-BD202A5B3F3A}" type="datetimeFigureOut">
               <a:rPr lang="en-US" smtClean="0"/>
-              <a:t>1/25/2016</a:t>
+              <a:t>1/26/2016</a:t>
             </a:fld>
             <a:endParaRPr lang="en-US"/>
           </a:p>
@@ -1376,7 +1376,7 @@
           <a:p>
             <a:fld id="{3453B918-D857-444D-9D36-BD202A5B3F3A}" type="datetimeFigureOut">
               <a:rPr lang="en-US" smtClean="0"/>
-              <a:t>1/25/2016</a:t>
+              <a:t>1/26/2016</a:t>
             </a:fld>
             <a:endParaRPr lang="en-US"/>
           </a:p>
@@ -1723,7 +1723,7 @@
           <a:p>
             <a:fld id="{3453B918-D857-444D-9D36-BD202A5B3F3A}" type="datetimeFigureOut">
               <a:rPr lang="en-US" smtClean="0"/>
-              <a:t>1/25/2016</a:t>
+              <a:t>1/26/2016</a:t>
             </a:fld>
             <a:endParaRPr lang="en-US"/>
           </a:p>
@@ -2097,7 +2097,7 @@
           <a:p>
             <a:fld id="{3453B918-D857-444D-9D36-BD202A5B3F3A}" type="datetimeFigureOut">
               <a:rPr lang="en-US" smtClean="0"/>
-              <a:t>1/25/2016</a:t>
+              <a:t>1/26/2016</a:t>
             </a:fld>
             <a:endParaRPr lang="en-US"/>
           </a:p>
@@ -2567,7 +2567,7 @@
           <a:p>
             <a:fld id="{3453B918-D857-444D-9D36-BD202A5B3F3A}" type="datetimeFigureOut">
               <a:rPr lang="en-US" smtClean="0"/>
-              <a:t>1/25/2016</a:t>
+              <a:t>1/26/2016</a:t>
             </a:fld>
             <a:endParaRPr lang="en-US"/>
           </a:p>
@@ -2772,7 +2772,7 @@
           <a:p>
             <a:fld id="{3453B918-D857-444D-9D36-BD202A5B3F3A}" type="datetimeFigureOut">
               <a:rPr lang="en-US" smtClean="0"/>
-              <a:t>1/25/2016</a:t>
+              <a:t>1/26/2016</a:t>
             </a:fld>
             <a:endParaRPr lang="en-US"/>
           </a:p>
@@ -2983,7 +2983,7 @@
           <a:p>
             <a:fld id="{3453B918-D857-444D-9D36-BD202A5B3F3A}" type="datetimeFigureOut">
               <a:rPr lang="en-US" smtClean="0"/>
-              <a:t>1/25/2016</a:t>
+              <a:t>1/26/2016</a:t>
             </a:fld>
             <a:endParaRPr lang="en-US"/>
           </a:p>
@@ -3215,7 +3215,7 @@
           <a:p>
             <a:fld id="{3453B918-D857-444D-9D36-BD202A5B3F3A}" type="datetimeFigureOut">
               <a:rPr lang="en-US" smtClean="0"/>
-              <a:t>1/25/2016</a:t>
+              <a:t>1/26/2016</a:t>
             </a:fld>
             <a:endParaRPr lang="en-US"/>
           </a:p>
@@ -3463,7 +3463,7 @@
           <a:p>
             <a:fld id="{3453B918-D857-444D-9D36-BD202A5B3F3A}" type="datetimeFigureOut">
               <a:rPr lang="en-US" smtClean="0"/>
-              <a:t>1/25/2016</a:t>
+              <a:t>1/26/2016</a:t>
             </a:fld>
             <a:endParaRPr lang="en-US"/>
           </a:p>
@@ -3730,7 +3730,7 @@
           <a:p>
             <a:fld id="{3453B918-D857-444D-9D36-BD202A5B3F3A}" type="datetimeFigureOut">
               <a:rPr lang="en-US" smtClean="0"/>
-              <a:t>1/25/2016</a:t>
+              <a:t>1/26/2016</a:t>
             </a:fld>
             <a:endParaRPr lang="en-US"/>
           </a:p>
@@ -4148,7 +4148,7 @@
           <a:p>
             <a:fld id="{3453B918-D857-444D-9D36-BD202A5B3F3A}" type="datetimeFigureOut">
               <a:rPr lang="en-US" smtClean="0"/>
-              <a:t>1/25/2016</a:t>
+              <a:t>1/26/2016</a:t>
             </a:fld>
             <a:endParaRPr lang="en-US"/>
           </a:p>
@@ -4302,7 +4302,7 @@
           <a:p>
             <a:fld id="{3453B918-D857-444D-9D36-BD202A5B3F3A}" type="datetimeFigureOut">
               <a:rPr lang="en-US" smtClean="0"/>
-              <a:t>1/25/2016</a:t>
+              <a:t>1/26/2016</a:t>
             </a:fld>
             <a:endParaRPr lang="en-US"/>
           </a:p>
@@ -4428,7 +4428,7 @@
           <a:p>
             <a:fld id="{3453B918-D857-444D-9D36-BD202A5B3F3A}" type="datetimeFigureOut">
               <a:rPr lang="en-US" smtClean="0"/>
-              <a:t>1/25/2016</a:t>
+              <a:t>1/26/2016</a:t>
             </a:fld>
             <a:endParaRPr lang="en-US"/>
           </a:p>
@@ -4683,7 +4683,7 @@
           <a:p>
             <a:fld id="{3453B918-D857-444D-9D36-BD202A5B3F3A}" type="datetimeFigureOut">
               <a:rPr lang="en-US" smtClean="0"/>
-              <a:t>1/25/2016</a:t>
+              <a:t>1/26/2016</a:t>
             </a:fld>
             <a:endParaRPr lang="en-US"/>
           </a:p>
@@ -5003,7 +5003,7 @@
           <a:p>
             <a:fld id="{3453B918-D857-444D-9D36-BD202A5B3F3A}" type="datetimeFigureOut">
               <a:rPr lang="en-US" smtClean="0"/>
-              <a:t>1/25/2016</a:t>
+              <a:t>1/26/2016</a:t>
             </a:fld>
             <a:endParaRPr lang="en-US"/>
           </a:p>
@@ -5354,7 +5354,7 @@
           <a:p>
             <a:fld id="{3453B918-D857-444D-9D36-BD202A5B3F3A}" type="datetimeFigureOut">
               <a:rPr lang="en-US" smtClean="0"/>
-              <a:t>1/25/2016</a:t>
+              <a:t>1/26/2016</a:t>
             </a:fld>
             <a:endParaRPr lang="en-US"/>
           </a:p>
@@ -6036,7 +6036,6 @@
               <a:rPr lang="en-US" dirty="0"/>
               <a:t>Completed (Research)</a:t>
             </a:r>
-            <a:endParaRPr lang="en-US" dirty="0"/>
           </a:p>
         </p:txBody>
       </p:sp>
@@ -6072,7 +6071,6 @@
               <a:rPr lang="en-US" dirty="0"/>
               <a:t>Created a survey to get public opinion of certain aspects of our app (not yet distributed).</a:t>
             </a:r>
-            <a:endParaRPr lang="en-US" dirty="0"/>
           </a:p>
         </p:txBody>
       </p:sp>
@@ -6366,7 +6364,6 @@
               <a:rPr lang="en-US" dirty="0"/>
               <a:t>To Do:</a:t>
             </a:r>
-            <a:endParaRPr lang="en-US" dirty="0"/>
           </a:p>
         </p:txBody>
       </p:sp>
@@ -7144,15 +7141,19 @@
           <a:p>
             <a:r>
               <a:rPr lang="en-US" dirty="0" smtClean="0"/>
-              <a:t>“According </a:t>
+              <a:t>According </a:t>
             </a:r>
             <a:r>
               <a:rPr lang="en-US" dirty="0"/>
-              <a:t>to U.S. News &amp; World Report, as of 2014, the University of Oklahoma’s average freshman retention rate is at 84.5</a:t>
-            </a:r>
-            <a:r>
-              <a:rPr lang="en-US" dirty="0" smtClean="0"/>
-              <a:t>%” </a:t>
+              <a:t>to U.S. News &amp; World Report, as of 2014, the University of Oklahoma’s average freshman retention rate is at </a:t>
+            </a:r>
+            <a:r>
+              <a:rPr lang="en-US"/>
+              <a:t>84.5</a:t>
+            </a:r>
+            <a:r>
+              <a:rPr lang="en-US" smtClean="0"/>
+              <a:t>% </a:t>
             </a:r>
             <a:r>
               <a:rPr lang="en-US" dirty="0"/>
@@ -7839,7 +7840,6 @@
               <a:rPr lang="en-US" dirty="0"/>
               <a:t>What is Tag Up?</a:t>
             </a:r>
-            <a:endParaRPr lang="en-US" dirty="0"/>
           </a:p>
         </p:txBody>
       </p:sp>
@@ -7893,7 +7893,6 @@
               <a:rPr lang="en-US" b="1" dirty="0"/>
               <a:t>App sorts users into groups of 3-5 and sets a date, location, and time for the meeting.</a:t>
             </a:r>
-            <a:endParaRPr lang="en-US" b="1" dirty="0"/>
           </a:p>
         </p:txBody>
       </p:sp>
@@ -8496,7 +8495,6 @@
               <a:rPr lang="en-US" dirty="0"/>
               <a:t>Additional Functions</a:t>
             </a:r>
-            <a:endParaRPr lang="en-US" dirty="0"/>
           </a:p>
         </p:txBody>
       </p:sp>
@@ -9378,7 +9376,6 @@
               <a:rPr lang="en-US" dirty="0"/>
               <a:t>Solution</a:t>
             </a:r>
-            <a:endParaRPr lang="en-US" dirty="0"/>
           </a:p>
         </p:txBody>
       </p:sp>

</xml_diff>

<commit_message>
Added some important stuff from one u cup
</commit_message>
<xml_diff>
--- a/PRESENTATION MATERIAL/TagUp Presentation.pptx
+++ b/PRESENTATION MATERIAL/TagUp Presentation.pptx
@@ -8,15 +8,17 @@
     <p:sldId id="256" r:id="rId2"/>
     <p:sldId id="257" r:id="rId3"/>
     <p:sldId id="272" r:id="rId4"/>
-    <p:sldId id="273" r:id="rId5"/>
-    <p:sldId id="274" r:id="rId6"/>
+    <p:sldId id="274" r:id="rId5"/>
+    <p:sldId id="273" r:id="rId6"/>
     <p:sldId id="264" r:id="rId7"/>
     <p:sldId id="266" r:id="rId8"/>
     <p:sldId id="270" r:id="rId9"/>
     <p:sldId id="265" r:id="rId10"/>
     <p:sldId id="275" r:id="rId11"/>
     <p:sldId id="276" r:id="rId12"/>
-    <p:sldId id="269" r:id="rId13"/>
+    <p:sldId id="278" r:id="rId13"/>
+    <p:sldId id="277" r:id="rId14"/>
+    <p:sldId id="269" r:id="rId15"/>
   </p:sldIdLst>
   <p:sldSz cx="12192000" cy="6858000"/>
   <p:notesSz cx="6858000" cy="9144000"/>
@@ -465,7 +467,7 @@
           <a:p>
             <a:fld id="{3453B918-D857-444D-9D36-BD202A5B3F3A}" type="datetimeFigureOut">
               <a:rPr lang="en-US" smtClean="0"/>
-              <a:t>1/26/2016</a:t>
+              <a:t>1/29/2016</a:t>
             </a:fld>
             <a:endParaRPr lang="en-US"/>
           </a:p>
@@ -789,7 +791,7 @@
           <a:p>
             <a:fld id="{3453B918-D857-444D-9D36-BD202A5B3F3A}" type="datetimeFigureOut">
               <a:rPr lang="en-US" smtClean="0"/>
-              <a:t>1/26/2016</a:t>
+              <a:t>1/29/2016</a:t>
             </a:fld>
             <a:endParaRPr lang="en-US"/>
           </a:p>
@@ -1037,7 +1039,7 @@
           <a:p>
             <a:fld id="{3453B918-D857-444D-9D36-BD202A5B3F3A}" type="datetimeFigureOut">
               <a:rPr lang="en-US" smtClean="0"/>
-              <a:t>1/26/2016</a:t>
+              <a:t>1/29/2016</a:t>
             </a:fld>
             <a:endParaRPr lang="en-US"/>
           </a:p>
@@ -1376,7 +1378,7 @@
           <a:p>
             <a:fld id="{3453B918-D857-444D-9D36-BD202A5B3F3A}" type="datetimeFigureOut">
               <a:rPr lang="en-US" smtClean="0"/>
-              <a:t>1/26/2016</a:t>
+              <a:t>1/29/2016</a:t>
             </a:fld>
             <a:endParaRPr lang="en-US"/>
           </a:p>
@@ -1723,7 +1725,7 @@
           <a:p>
             <a:fld id="{3453B918-D857-444D-9D36-BD202A5B3F3A}" type="datetimeFigureOut">
               <a:rPr lang="en-US" smtClean="0"/>
-              <a:t>1/26/2016</a:t>
+              <a:t>1/29/2016</a:t>
             </a:fld>
             <a:endParaRPr lang="en-US"/>
           </a:p>
@@ -2097,7 +2099,7 @@
           <a:p>
             <a:fld id="{3453B918-D857-444D-9D36-BD202A5B3F3A}" type="datetimeFigureOut">
               <a:rPr lang="en-US" smtClean="0"/>
-              <a:t>1/26/2016</a:t>
+              <a:t>1/29/2016</a:t>
             </a:fld>
             <a:endParaRPr lang="en-US"/>
           </a:p>
@@ -2567,7 +2569,7 @@
           <a:p>
             <a:fld id="{3453B918-D857-444D-9D36-BD202A5B3F3A}" type="datetimeFigureOut">
               <a:rPr lang="en-US" smtClean="0"/>
-              <a:t>1/26/2016</a:t>
+              <a:t>1/29/2016</a:t>
             </a:fld>
             <a:endParaRPr lang="en-US"/>
           </a:p>
@@ -2772,7 +2774,7 @@
           <a:p>
             <a:fld id="{3453B918-D857-444D-9D36-BD202A5B3F3A}" type="datetimeFigureOut">
               <a:rPr lang="en-US" smtClean="0"/>
-              <a:t>1/26/2016</a:t>
+              <a:t>1/29/2016</a:t>
             </a:fld>
             <a:endParaRPr lang="en-US"/>
           </a:p>
@@ -2983,7 +2985,7 @@
           <a:p>
             <a:fld id="{3453B918-D857-444D-9D36-BD202A5B3F3A}" type="datetimeFigureOut">
               <a:rPr lang="en-US" smtClean="0"/>
-              <a:t>1/26/2016</a:t>
+              <a:t>1/29/2016</a:t>
             </a:fld>
             <a:endParaRPr lang="en-US"/>
           </a:p>
@@ -3215,7 +3217,7 @@
           <a:p>
             <a:fld id="{3453B918-D857-444D-9D36-BD202A5B3F3A}" type="datetimeFigureOut">
               <a:rPr lang="en-US" smtClean="0"/>
-              <a:t>1/26/2016</a:t>
+              <a:t>1/29/2016</a:t>
             </a:fld>
             <a:endParaRPr lang="en-US"/>
           </a:p>
@@ -3463,7 +3465,7 @@
           <a:p>
             <a:fld id="{3453B918-D857-444D-9D36-BD202A5B3F3A}" type="datetimeFigureOut">
               <a:rPr lang="en-US" smtClean="0"/>
-              <a:t>1/26/2016</a:t>
+              <a:t>1/29/2016</a:t>
             </a:fld>
             <a:endParaRPr lang="en-US"/>
           </a:p>
@@ -3730,7 +3732,7 @@
           <a:p>
             <a:fld id="{3453B918-D857-444D-9D36-BD202A5B3F3A}" type="datetimeFigureOut">
               <a:rPr lang="en-US" smtClean="0"/>
-              <a:t>1/26/2016</a:t>
+              <a:t>1/29/2016</a:t>
             </a:fld>
             <a:endParaRPr lang="en-US"/>
           </a:p>
@@ -4148,7 +4150,7 @@
           <a:p>
             <a:fld id="{3453B918-D857-444D-9D36-BD202A5B3F3A}" type="datetimeFigureOut">
               <a:rPr lang="en-US" smtClean="0"/>
-              <a:t>1/26/2016</a:t>
+              <a:t>1/29/2016</a:t>
             </a:fld>
             <a:endParaRPr lang="en-US"/>
           </a:p>
@@ -4302,7 +4304,7 @@
           <a:p>
             <a:fld id="{3453B918-D857-444D-9D36-BD202A5B3F3A}" type="datetimeFigureOut">
               <a:rPr lang="en-US" smtClean="0"/>
-              <a:t>1/26/2016</a:t>
+              <a:t>1/29/2016</a:t>
             </a:fld>
             <a:endParaRPr lang="en-US"/>
           </a:p>
@@ -4428,7 +4430,7 @@
           <a:p>
             <a:fld id="{3453B918-D857-444D-9D36-BD202A5B3F3A}" type="datetimeFigureOut">
               <a:rPr lang="en-US" smtClean="0"/>
-              <a:t>1/26/2016</a:t>
+              <a:t>1/29/2016</a:t>
             </a:fld>
             <a:endParaRPr lang="en-US"/>
           </a:p>
@@ -4683,7 +4685,7 @@
           <a:p>
             <a:fld id="{3453B918-D857-444D-9D36-BD202A5B3F3A}" type="datetimeFigureOut">
               <a:rPr lang="en-US" smtClean="0"/>
-              <a:t>1/26/2016</a:t>
+              <a:t>1/29/2016</a:t>
             </a:fld>
             <a:endParaRPr lang="en-US"/>
           </a:p>
@@ -5003,7 +5005,7 @@
           <a:p>
             <a:fld id="{3453B918-D857-444D-9D36-BD202A5B3F3A}" type="datetimeFigureOut">
               <a:rPr lang="en-US" smtClean="0"/>
-              <a:t>1/26/2016</a:t>
+              <a:t>1/29/2016</a:t>
             </a:fld>
             <a:endParaRPr lang="en-US"/>
           </a:p>
@@ -5354,7 +5356,7 @@
           <a:p>
             <a:fld id="{3453B918-D857-444D-9D36-BD202A5B3F3A}" type="datetimeFigureOut">
               <a:rPr lang="en-US" smtClean="0"/>
-              <a:t>1/26/2016</a:t>
+              <a:t>1/29/2016</a:t>
             </a:fld>
             <a:endParaRPr lang="en-US"/>
           </a:p>
@@ -6033,8 +6035,12 @@
           <a:lstStyle/>
           <a:p>
             <a:r>
+              <a:rPr lang="en-US" dirty="0" smtClean="0"/>
+              <a:t>In Progress (Research</a:t>
+            </a:r>
+            <a:r>
               <a:rPr lang="en-US" dirty="0"/>
-              <a:t>Completed (Research)</a:t>
+              <a:t>)</a:t>
             </a:r>
           </a:p>
         </p:txBody>
@@ -7015,6 +7021,186 @@
           <a:p>
             <a:r>
               <a:rPr lang="en-US" dirty="0" smtClean="0"/>
+              <a:t>Current Needs</a:t>
+            </a:r>
+            <a:endParaRPr lang="en-US" dirty="0"/>
+          </a:p>
+        </p:txBody>
+      </p:sp>
+      <p:sp>
+        <p:nvSpPr>
+          <p:cNvPr id="3" name="Content Placeholder 2"/>
+          <p:cNvSpPr>
+            <a:spLocks noGrp="1"/>
+          </p:cNvSpPr>
+          <p:nvPr>
+            <p:ph idx="1"/>
+          </p:nvPr>
+        </p:nvSpPr>
+        <p:spPr/>
+        <p:txBody>
+          <a:bodyPr/>
+          <a:lstStyle/>
+          <a:p>
+            <a:r>
+              <a:rPr lang="en-US" dirty="0" smtClean="0"/>
+              <a:t>Private code repository</a:t>
+            </a:r>
+          </a:p>
+          <a:p>
+            <a:r>
+              <a:rPr lang="en-US" dirty="0" smtClean="0"/>
+              <a:t>Test devices running Android (not critical </a:t>
+            </a:r>
+            <a:r>
+              <a:rPr lang="en-US" smtClean="0"/>
+              <a:t>this semester)</a:t>
+            </a:r>
+            <a:endParaRPr lang="en-US" dirty="0"/>
+          </a:p>
+        </p:txBody>
+      </p:sp>
+    </p:spTree>
+    <p:extLst>
+      <p:ext uri="{BB962C8B-B14F-4D97-AF65-F5344CB8AC3E}">
+        <p14:creationId xmlns:p14="http://schemas.microsoft.com/office/powerpoint/2010/main" val="1749773377"/>
+      </p:ext>
+    </p:extLst>
+  </p:cSld>
+  <p:clrMapOvr>
+    <a:masterClrMapping/>
+  </p:clrMapOvr>
+</p:sld>
+</file>
+
+<file path=ppt/slides/slide13.xml><?xml version="1.0" encoding="utf-8"?>
+<p:sld xmlns:a="http://schemas.openxmlformats.org/drawingml/2006/main" xmlns:r="http://schemas.openxmlformats.org/officeDocument/2006/relationships" xmlns:p="http://schemas.openxmlformats.org/presentationml/2006/main">
+  <p:cSld>
+    <p:spTree>
+      <p:nvGrpSpPr>
+        <p:cNvPr id="1" name=""/>
+        <p:cNvGrpSpPr/>
+        <p:nvPr/>
+      </p:nvGrpSpPr>
+      <p:grpSpPr>
+        <a:xfrm>
+          <a:off x="0" y="0"/>
+          <a:ext cx="0" cy="0"/>
+          <a:chOff x="0" y="0"/>
+          <a:chExt cx="0" cy="0"/>
+        </a:xfrm>
+      </p:grpSpPr>
+      <p:sp>
+        <p:nvSpPr>
+          <p:cNvPr id="2" name="Title 1"/>
+          <p:cNvSpPr>
+            <a:spLocks noGrp="1"/>
+          </p:cNvSpPr>
+          <p:nvPr>
+            <p:ph type="title"/>
+          </p:nvPr>
+        </p:nvSpPr>
+        <p:spPr/>
+        <p:txBody>
+          <a:bodyPr/>
+          <a:lstStyle/>
+          <a:p>
+            <a:r>
+              <a:rPr lang="en-US" dirty="0" smtClean="0"/>
+              <a:t>Summary</a:t>
+            </a:r>
+            <a:endParaRPr lang="en-US" dirty="0"/>
+          </a:p>
+        </p:txBody>
+      </p:sp>
+      <p:sp>
+        <p:nvSpPr>
+          <p:cNvPr id="3" name="Content Placeholder 2"/>
+          <p:cNvSpPr>
+            <a:spLocks noGrp="1"/>
+          </p:cNvSpPr>
+          <p:nvPr>
+            <p:ph idx="1"/>
+          </p:nvPr>
+        </p:nvSpPr>
+        <p:spPr/>
+        <p:txBody>
+          <a:bodyPr/>
+          <a:lstStyle/>
+          <a:p>
+            <a:r>
+              <a:rPr lang="en-US" dirty="0" smtClean="0"/>
+              <a:t>15% of freshmen drop out, nationwide</a:t>
+            </a:r>
+          </a:p>
+          <a:p>
+            <a:r>
+              <a:rPr lang="en-US" dirty="0" smtClean="0"/>
+              <a:t>Many students may not continue because they don’t feel connected</a:t>
+            </a:r>
+          </a:p>
+          <a:p>
+            <a:r>
+              <a:rPr lang="en-US" dirty="0" err="1" smtClean="0"/>
+              <a:t>TagUp</a:t>
+            </a:r>
+            <a:r>
+              <a:rPr lang="en-US" dirty="0" smtClean="0"/>
+              <a:t> seeks to solve this problem by connecting students over food</a:t>
+            </a:r>
+          </a:p>
+          <a:p>
+            <a:endParaRPr lang="en-US" dirty="0"/>
+          </a:p>
+        </p:txBody>
+      </p:sp>
+    </p:spTree>
+    <p:extLst>
+      <p:ext uri="{BB962C8B-B14F-4D97-AF65-F5344CB8AC3E}">
+        <p14:creationId xmlns:p14="http://schemas.microsoft.com/office/powerpoint/2010/main" val="4289287991"/>
+      </p:ext>
+    </p:extLst>
+  </p:cSld>
+  <p:clrMapOvr>
+    <a:masterClrMapping/>
+  </p:clrMapOvr>
+</p:sld>
+</file>
+
+<file path=ppt/slides/slide14.xml><?xml version="1.0" encoding="utf-8"?>
+<p:sld xmlns:a="http://schemas.openxmlformats.org/drawingml/2006/main" xmlns:r="http://schemas.openxmlformats.org/officeDocument/2006/relationships" xmlns:p="http://schemas.openxmlformats.org/presentationml/2006/main">
+  <p:cSld>
+    <p:spTree>
+      <p:nvGrpSpPr>
+        <p:cNvPr id="1" name=""/>
+        <p:cNvGrpSpPr/>
+        <p:nvPr/>
+      </p:nvGrpSpPr>
+      <p:grpSpPr>
+        <a:xfrm>
+          <a:off x="0" y="0"/>
+          <a:ext cx="0" cy="0"/>
+          <a:chOff x="0" y="0"/>
+          <a:chExt cx="0" cy="0"/>
+        </a:xfrm>
+      </p:grpSpPr>
+      <p:sp>
+        <p:nvSpPr>
+          <p:cNvPr id="2" name="Title 1"/>
+          <p:cNvSpPr>
+            <a:spLocks noGrp="1"/>
+          </p:cNvSpPr>
+          <p:nvPr>
+            <p:ph type="title"/>
+          </p:nvPr>
+        </p:nvSpPr>
+        <p:spPr/>
+        <p:txBody>
+          <a:bodyPr/>
+          <a:lstStyle/>
+          <a:p>
+            <a:r>
+              <a:rPr lang="en-US" dirty="0" smtClean="0"/>
               <a:t>Sources</a:t>
             </a:r>
             <a:endParaRPr lang="en-US" dirty="0"/>
@@ -7145,14 +7331,10 @@
             </a:r>
             <a:r>
               <a:rPr lang="en-US" dirty="0"/>
-              <a:t>to U.S. News &amp; World Report, as of 2014, the University of Oklahoma’s average freshman retention rate is at </a:t>
-            </a:r>
-            <a:r>
-              <a:rPr lang="en-US"/>
-              <a:t>84.5</a:t>
-            </a:r>
-            <a:r>
-              <a:rPr lang="en-US" smtClean="0"/>
+              <a:t>to U.S. News &amp; World Report, as of 2014, the University of Oklahoma’s average freshman retention rate is at 84.5</a:t>
+            </a:r>
+            <a:r>
+              <a:rPr lang="en-US" dirty="0" smtClean="0"/>
               <a:t>% </a:t>
             </a:r>
             <a:r>
@@ -7867,7 +8049,15 @@
           <a:p>
             <a:r>
               <a:rPr lang="en-US" dirty="0"/>
-              <a:t>Tag Up is an app designed to facilitate the connection of students to peers with similar interests by setting up lunch meetings in groups of 3-5 based on details provided in the profile.</a:t>
+              <a:t>Tag Up is an app designed to </a:t>
+            </a:r>
+            <a:r>
+              <a:rPr lang="en-US" b="1" dirty="0"/>
+              <a:t>facilitate the connection of students</a:t>
+            </a:r>
+            <a:r>
+              <a:rPr lang="en-US" dirty="0"/>
+              <a:t> to peers with similar interests by setting up lunch meetings in groups of 3-5 based on details provided in the profile.</a:t>
             </a:r>
           </a:p>
           <a:p>
@@ -8493,6 +8683,641 @@
           <a:p>
             <a:r>
               <a:rPr lang="en-US" dirty="0"/>
+              <a:t>Solution</a:t>
+            </a:r>
+          </a:p>
+        </p:txBody>
+      </p:sp>
+      <p:sp>
+        <p:nvSpPr>
+          <p:cNvPr id="3" name="Content Placeholder 2"/>
+          <p:cNvSpPr>
+            <a:spLocks noGrp="1"/>
+          </p:cNvSpPr>
+          <p:nvPr>
+            <p:ph idx="1"/>
+          </p:nvPr>
+        </p:nvSpPr>
+        <p:spPr>
+          <a:xfrm>
+            <a:off x="1295402" y="2547601"/>
+            <a:ext cx="9601196" cy="3318936"/>
+          </a:xfrm>
+        </p:spPr>
+        <p:txBody>
+          <a:bodyPr>
+            <a:normAutofit lnSpcReduction="10000"/>
+          </a:bodyPr>
+          <a:lstStyle/>
+          <a:p>
+            <a:r>
+              <a:rPr lang="en-US" dirty="0"/>
+              <a:t>Students feel intimidated to reach out to new people. </a:t>
+            </a:r>
+            <a:r>
+              <a:rPr lang="en-US" dirty="0">
+                <a:sym typeface="Wingdings" panose="05000000000000000000" pitchFamily="2" charset="2"/>
+              </a:rPr>
+              <a:t> Tag Up automatically groups them </a:t>
+            </a:r>
+            <a:r>
+              <a:rPr lang="en-US" dirty="0" smtClean="0">
+                <a:sym typeface="Wingdings" panose="05000000000000000000" pitchFamily="2" charset="2"/>
+              </a:rPr>
+              <a:t>up by info given </a:t>
+            </a:r>
+            <a:r>
+              <a:rPr lang="en-US" dirty="0">
+                <a:sym typeface="Wingdings" panose="05000000000000000000" pitchFamily="2" charset="2"/>
+              </a:rPr>
+              <a:t>and </a:t>
+            </a:r>
+            <a:r>
+              <a:rPr lang="en-US" dirty="0" smtClean="0">
+                <a:sym typeface="Wingdings" panose="05000000000000000000" pitchFamily="2" charset="2"/>
+              </a:rPr>
+              <a:t>figures out a perfect lunch </a:t>
+            </a:r>
+            <a:r>
+              <a:rPr lang="en-US" dirty="0">
+                <a:sym typeface="Wingdings" panose="05000000000000000000" pitchFamily="2" charset="2"/>
+              </a:rPr>
+              <a:t>meeting.</a:t>
+            </a:r>
+          </a:p>
+          <a:p>
+            <a:r>
+              <a:rPr lang="en-US" dirty="0">
+                <a:sym typeface="Wingdings" panose="05000000000000000000" pitchFamily="2" charset="2"/>
+              </a:rPr>
+              <a:t>Students are </a:t>
+            </a:r>
+            <a:r>
+              <a:rPr lang="en-US" dirty="0"/>
+              <a:t>reluctant to talk with strangers. </a:t>
+            </a:r>
+            <a:r>
+              <a:rPr lang="en-US" dirty="0">
+                <a:sym typeface="Wingdings" panose="05000000000000000000" pitchFamily="2" charset="2"/>
+              </a:rPr>
+              <a:t> Tag Up matches </a:t>
+            </a:r>
+            <a:r>
+              <a:rPr lang="en-US" dirty="0" smtClean="0">
+                <a:sym typeface="Wingdings" panose="05000000000000000000" pitchFamily="2" charset="2"/>
+              </a:rPr>
+              <a:t>students </a:t>
+            </a:r>
+            <a:r>
+              <a:rPr lang="en-US" dirty="0">
+                <a:sym typeface="Wingdings" panose="05000000000000000000" pitchFamily="2" charset="2"/>
+              </a:rPr>
+              <a:t>with people </a:t>
+            </a:r>
+            <a:r>
+              <a:rPr lang="en-US" dirty="0" smtClean="0">
+                <a:sym typeface="Wingdings" panose="05000000000000000000" pitchFamily="2" charset="2"/>
+              </a:rPr>
+              <a:t>that have </a:t>
+            </a:r>
+            <a:r>
+              <a:rPr lang="en-US" dirty="0">
+                <a:sym typeface="Wingdings" panose="05000000000000000000" pitchFamily="2" charset="2"/>
+              </a:rPr>
+              <a:t>common interests and </a:t>
+            </a:r>
+            <a:r>
+              <a:rPr lang="en-US" dirty="0" smtClean="0">
+                <a:sym typeface="Wingdings" panose="05000000000000000000" pitchFamily="2" charset="2"/>
+              </a:rPr>
+              <a:t>personalities.</a:t>
+            </a:r>
+            <a:endParaRPr lang="en-US" dirty="0">
+              <a:sym typeface="Wingdings" panose="05000000000000000000" pitchFamily="2" charset="2"/>
+            </a:endParaRPr>
+          </a:p>
+          <a:p>
+            <a:r>
+              <a:rPr lang="en-US" dirty="0">
+                <a:sym typeface="Wingdings" panose="05000000000000000000" pitchFamily="2" charset="2"/>
+              </a:rPr>
+              <a:t>Students are too busy.  Tag Up matches them based on free </a:t>
+            </a:r>
+            <a:r>
+              <a:rPr lang="en-US" dirty="0" smtClean="0">
+                <a:sym typeface="Wingdings" panose="05000000000000000000" pitchFamily="2" charset="2"/>
+              </a:rPr>
+              <a:t>time.</a:t>
+            </a:r>
+            <a:endParaRPr lang="en-US" dirty="0">
+              <a:sym typeface="Wingdings" panose="05000000000000000000" pitchFamily="2" charset="2"/>
+            </a:endParaRPr>
+          </a:p>
+          <a:p>
+            <a:r>
+              <a:rPr lang="en-US" dirty="0">
+                <a:sym typeface="Wingdings" panose="05000000000000000000" pitchFamily="2" charset="2"/>
+              </a:rPr>
+              <a:t>Lasting connections are what make a difference.  Tag Up encourages follow-up meetings.</a:t>
+            </a:r>
+            <a:endParaRPr lang="en-US" dirty="0"/>
+          </a:p>
+        </p:txBody>
+      </p:sp>
+    </p:spTree>
+    <p:extLst>
+      <p:ext uri="{BB962C8B-B14F-4D97-AF65-F5344CB8AC3E}">
+        <p14:creationId xmlns:p14="http://schemas.microsoft.com/office/powerpoint/2010/main" val="3478906943"/>
+      </p:ext>
+    </p:extLst>
+  </p:cSld>
+  <p:clrMapOvr>
+    <a:masterClrMapping/>
+  </p:clrMapOvr>
+  <p:timing>
+    <p:tnLst>
+      <p:par>
+        <p:cTn id="1" dur="indefinite" restart="never" nodeType="tmRoot">
+          <p:childTnLst>
+            <p:seq concurrent="1" nextAc="seek">
+              <p:cTn id="2" dur="indefinite" nodeType="mainSeq">
+                <p:childTnLst>
+                  <p:par>
+                    <p:cTn id="3" fill="hold">
+                      <p:stCondLst>
+                        <p:cond delay="indefinite"/>
+                      </p:stCondLst>
+                      <p:childTnLst>
+                        <p:par>
+                          <p:cTn id="4" fill="hold">
+                            <p:stCondLst>
+                              <p:cond delay="0"/>
+                            </p:stCondLst>
+                            <p:childTnLst>
+                              <p:par>
+                                <p:cTn id="5" presetID="2" presetClass="entr" presetSubtype="4" fill="hold" grpId="0" nodeType="clickEffect">
+                                  <p:stCondLst>
+                                    <p:cond delay="0"/>
+                                  </p:stCondLst>
+                                  <p:childTnLst>
+                                    <p:set>
+                                      <p:cBhvr>
+                                        <p:cTn id="6" dur="1" fill="hold">
+                                          <p:stCondLst>
+                                            <p:cond delay="0"/>
+                                          </p:stCondLst>
+                                        </p:cTn>
+                                        <p:tgtEl>
+                                          <p:spTgt spid="3">
+                                            <p:txEl>
+                                              <p:pRg st="0" end="0"/>
+                                            </p:txEl>
+                                          </p:spTgt>
+                                        </p:tgtEl>
+                                        <p:attrNameLst>
+                                          <p:attrName>style.visibility</p:attrName>
+                                        </p:attrNameLst>
+                                      </p:cBhvr>
+                                      <p:to>
+                                        <p:strVal val="visible"/>
+                                      </p:to>
+                                    </p:set>
+                                    <p:anim calcmode="lin" valueType="num">
+                                      <p:cBhvr additive="base">
+                                        <p:cTn id="7" dur="500" fill="hold"/>
+                                        <p:tgtEl>
+                                          <p:spTgt spid="3">
+                                            <p:txEl>
+                                              <p:pRg st="0" end="0"/>
+                                            </p:txEl>
+                                          </p:spTgt>
+                                        </p:tgtEl>
+                                        <p:attrNameLst>
+                                          <p:attrName>ppt_x</p:attrName>
+                                        </p:attrNameLst>
+                                      </p:cBhvr>
+                                      <p:tavLst>
+                                        <p:tav tm="0">
+                                          <p:val>
+                                            <p:strVal val="#ppt_x"/>
+                                          </p:val>
+                                        </p:tav>
+                                        <p:tav tm="100000">
+                                          <p:val>
+                                            <p:strVal val="#ppt_x"/>
+                                          </p:val>
+                                        </p:tav>
+                                      </p:tavLst>
+                                    </p:anim>
+                                    <p:anim calcmode="lin" valueType="num">
+                                      <p:cBhvr additive="base">
+                                        <p:cTn id="8" dur="500" fill="hold"/>
+                                        <p:tgtEl>
+                                          <p:spTgt spid="3">
+                                            <p:txEl>
+                                              <p:pRg st="0" end="0"/>
+                                            </p:txEl>
+                                          </p:spTgt>
+                                        </p:tgtEl>
+                                        <p:attrNameLst>
+                                          <p:attrName>ppt_y</p:attrName>
+                                        </p:attrNameLst>
+                                      </p:cBhvr>
+                                      <p:tavLst>
+                                        <p:tav tm="0">
+                                          <p:val>
+                                            <p:strVal val="1+#ppt_h/2"/>
+                                          </p:val>
+                                        </p:tav>
+                                        <p:tav tm="100000">
+                                          <p:val>
+                                            <p:strVal val="#ppt_y"/>
+                                          </p:val>
+                                        </p:tav>
+                                      </p:tavLst>
+                                    </p:anim>
+                                  </p:childTnLst>
+                                </p:cTn>
+                              </p:par>
+                            </p:childTnLst>
+                          </p:cTn>
+                        </p:par>
+                      </p:childTnLst>
+                    </p:cTn>
+                  </p:par>
+                  <p:par>
+                    <p:cTn id="9" fill="hold">
+                      <p:stCondLst>
+                        <p:cond delay="indefinite"/>
+                      </p:stCondLst>
+                      <p:childTnLst>
+                        <p:par>
+                          <p:cTn id="10" fill="hold">
+                            <p:stCondLst>
+                              <p:cond delay="0"/>
+                            </p:stCondLst>
+                            <p:childTnLst>
+                              <p:par>
+                                <p:cTn id="11" presetID="2" presetClass="entr" presetSubtype="4" fill="hold" grpId="0" nodeType="clickEffect">
+                                  <p:stCondLst>
+                                    <p:cond delay="0"/>
+                                  </p:stCondLst>
+                                  <p:childTnLst>
+                                    <p:set>
+                                      <p:cBhvr>
+                                        <p:cTn id="12" dur="1" fill="hold">
+                                          <p:stCondLst>
+                                            <p:cond delay="0"/>
+                                          </p:stCondLst>
+                                        </p:cTn>
+                                        <p:tgtEl>
+                                          <p:spTgt spid="3">
+                                            <p:txEl>
+                                              <p:pRg st="1" end="1"/>
+                                            </p:txEl>
+                                          </p:spTgt>
+                                        </p:tgtEl>
+                                        <p:attrNameLst>
+                                          <p:attrName>style.visibility</p:attrName>
+                                        </p:attrNameLst>
+                                      </p:cBhvr>
+                                      <p:to>
+                                        <p:strVal val="visible"/>
+                                      </p:to>
+                                    </p:set>
+                                    <p:anim calcmode="lin" valueType="num">
+                                      <p:cBhvr additive="base">
+                                        <p:cTn id="13" dur="500" fill="hold"/>
+                                        <p:tgtEl>
+                                          <p:spTgt spid="3">
+                                            <p:txEl>
+                                              <p:pRg st="1" end="1"/>
+                                            </p:txEl>
+                                          </p:spTgt>
+                                        </p:tgtEl>
+                                        <p:attrNameLst>
+                                          <p:attrName>ppt_x</p:attrName>
+                                        </p:attrNameLst>
+                                      </p:cBhvr>
+                                      <p:tavLst>
+                                        <p:tav tm="0">
+                                          <p:val>
+                                            <p:strVal val="#ppt_x"/>
+                                          </p:val>
+                                        </p:tav>
+                                        <p:tav tm="100000">
+                                          <p:val>
+                                            <p:strVal val="#ppt_x"/>
+                                          </p:val>
+                                        </p:tav>
+                                      </p:tavLst>
+                                    </p:anim>
+                                    <p:anim calcmode="lin" valueType="num">
+                                      <p:cBhvr additive="base">
+                                        <p:cTn id="14" dur="500" fill="hold"/>
+                                        <p:tgtEl>
+                                          <p:spTgt spid="3">
+                                            <p:txEl>
+                                              <p:pRg st="1" end="1"/>
+                                            </p:txEl>
+                                          </p:spTgt>
+                                        </p:tgtEl>
+                                        <p:attrNameLst>
+                                          <p:attrName>ppt_y</p:attrName>
+                                        </p:attrNameLst>
+                                      </p:cBhvr>
+                                      <p:tavLst>
+                                        <p:tav tm="0">
+                                          <p:val>
+                                            <p:strVal val="1+#ppt_h/2"/>
+                                          </p:val>
+                                        </p:tav>
+                                        <p:tav tm="100000">
+                                          <p:val>
+                                            <p:strVal val="#ppt_y"/>
+                                          </p:val>
+                                        </p:tav>
+                                      </p:tavLst>
+                                    </p:anim>
+                                  </p:childTnLst>
+                                </p:cTn>
+                              </p:par>
+                            </p:childTnLst>
+                          </p:cTn>
+                        </p:par>
+                      </p:childTnLst>
+                    </p:cTn>
+                  </p:par>
+                  <p:par>
+                    <p:cTn id="15" fill="hold">
+                      <p:stCondLst>
+                        <p:cond delay="indefinite"/>
+                      </p:stCondLst>
+                      <p:childTnLst>
+                        <p:par>
+                          <p:cTn id="16" fill="hold">
+                            <p:stCondLst>
+                              <p:cond delay="0"/>
+                            </p:stCondLst>
+                            <p:childTnLst>
+                              <p:par>
+                                <p:cTn id="17" presetID="2" presetClass="entr" presetSubtype="4" fill="hold" grpId="0" nodeType="clickEffect">
+                                  <p:stCondLst>
+                                    <p:cond delay="0"/>
+                                  </p:stCondLst>
+                                  <p:childTnLst>
+                                    <p:set>
+                                      <p:cBhvr>
+                                        <p:cTn id="18" dur="1" fill="hold">
+                                          <p:stCondLst>
+                                            <p:cond delay="0"/>
+                                          </p:stCondLst>
+                                        </p:cTn>
+                                        <p:tgtEl>
+                                          <p:spTgt spid="3">
+                                            <p:txEl>
+                                              <p:pRg st="2" end="2"/>
+                                            </p:txEl>
+                                          </p:spTgt>
+                                        </p:tgtEl>
+                                        <p:attrNameLst>
+                                          <p:attrName>style.visibility</p:attrName>
+                                        </p:attrNameLst>
+                                      </p:cBhvr>
+                                      <p:to>
+                                        <p:strVal val="visible"/>
+                                      </p:to>
+                                    </p:set>
+                                    <p:anim calcmode="lin" valueType="num">
+                                      <p:cBhvr additive="base">
+                                        <p:cTn id="19" dur="500" fill="hold"/>
+                                        <p:tgtEl>
+                                          <p:spTgt spid="3">
+                                            <p:txEl>
+                                              <p:pRg st="2" end="2"/>
+                                            </p:txEl>
+                                          </p:spTgt>
+                                        </p:tgtEl>
+                                        <p:attrNameLst>
+                                          <p:attrName>ppt_x</p:attrName>
+                                        </p:attrNameLst>
+                                      </p:cBhvr>
+                                      <p:tavLst>
+                                        <p:tav tm="0">
+                                          <p:val>
+                                            <p:strVal val="#ppt_x"/>
+                                          </p:val>
+                                        </p:tav>
+                                        <p:tav tm="100000">
+                                          <p:val>
+                                            <p:strVal val="#ppt_x"/>
+                                          </p:val>
+                                        </p:tav>
+                                      </p:tavLst>
+                                    </p:anim>
+                                    <p:anim calcmode="lin" valueType="num">
+                                      <p:cBhvr additive="base">
+                                        <p:cTn id="20" dur="500" fill="hold"/>
+                                        <p:tgtEl>
+                                          <p:spTgt spid="3">
+                                            <p:txEl>
+                                              <p:pRg st="2" end="2"/>
+                                            </p:txEl>
+                                          </p:spTgt>
+                                        </p:tgtEl>
+                                        <p:attrNameLst>
+                                          <p:attrName>ppt_y</p:attrName>
+                                        </p:attrNameLst>
+                                      </p:cBhvr>
+                                      <p:tavLst>
+                                        <p:tav tm="0">
+                                          <p:val>
+                                            <p:strVal val="1+#ppt_h/2"/>
+                                          </p:val>
+                                        </p:tav>
+                                        <p:tav tm="100000">
+                                          <p:val>
+                                            <p:strVal val="#ppt_y"/>
+                                          </p:val>
+                                        </p:tav>
+                                      </p:tavLst>
+                                    </p:anim>
+                                  </p:childTnLst>
+                                </p:cTn>
+                              </p:par>
+                            </p:childTnLst>
+                          </p:cTn>
+                        </p:par>
+                      </p:childTnLst>
+                    </p:cTn>
+                  </p:par>
+                  <p:par>
+                    <p:cTn id="21" fill="hold">
+                      <p:stCondLst>
+                        <p:cond delay="indefinite"/>
+                      </p:stCondLst>
+                      <p:childTnLst>
+                        <p:par>
+                          <p:cTn id="22" fill="hold">
+                            <p:stCondLst>
+                              <p:cond delay="0"/>
+                            </p:stCondLst>
+                            <p:childTnLst>
+                              <p:par>
+                                <p:cTn id="23" presetID="2" presetClass="entr" presetSubtype="4" fill="hold" grpId="0" nodeType="clickEffect">
+                                  <p:stCondLst>
+                                    <p:cond delay="0"/>
+                                  </p:stCondLst>
+                                  <p:childTnLst>
+                                    <p:set>
+                                      <p:cBhvr>
+                                        <p:cTn id="24" dur="1" fill="hold">
+                                          <p:stCondLst>
+                                            <p:cond delay="0"/>
+                                          </p:stCondLst>
+                                        </p:cTn>
+                                        <p:tgtEl>
+                                          <p:spTgt spid="3">
+                                            <p:txEl>
+                                              <p:pRg st="3" end="3"/>
+                                            </p:txEl>
+                                          </p:spTgt>
+                                        </p:tgtEl>
+                                        <p:attrNameLst>
+                                          <p:attrName>style.visibility</p:attrName>
+                                        </p:attrNameLst>
+                                      </p:cBhvr>
+                                      <p:to>
+                                        <p:strVal val="visible"/>
+                                      </p:to>
+                                    </p:set>
+                                    <p:anim calcmode="lin" valueType="num">
+                                      <p:cBhvr additive="base">
+                                        <p:cTn id="25" dur="500" fill="hold"/>
+                                        <p:tgtEl>
+                                          <p:spTgt spid="3">
+                                            <p:txEl>
+                                              <p:pRg st="3" end="3"/>
+                                            </p:txEl>
+                                          </p:spTgt>
+                                        </p:tgtEl>
+                                        <p:attrNameLst>
+                                          <p:attrName>ppt_x</p:attrName>
+                                        </p:attrNameLst>
+                                      </p:cBhvr>
+                                      <p:tavLst>
+                                        <p:tav tm="0">
+                                          <p:val>
+                                            <p:strVal val="#ppt_x"/>
+                                          </p:val>
+                                        </p:tav>
+                                        <p:tav tm="100000">
+                                          <p:val>
+                                            <p:strVal val="#ppt_x"/>
+                                          </p:val>
+                                        </p:tav>
+                                      </p:tavLst>
+                                    </p:anim>
+                                    <p:anim calcmode="lin" valueType="num">
+                                      <p:cBhvr additive="base">
+                                        <p:cTn id="26" dur="500" fill="hold"/>
+                                        <p:tgtEl>
+                                          <p:spTgt spid="3">
+                                            <p:txEl>
+                                              <p:pRg st="3" end="3"/>
+                                            </p:txEl>
+                                          </p:spTgt>
+                                        </p:tgtEl>
+                                        <p:attrNameLst>
+                                          <p:attrName>ppt_y</p:attrName>
+                                        </p:attrNameLst>
+                                      </p:cBhvr>
+                                      <p:tavLst>
+                                        <p:tav tm="0">
+                                          <p:val>
+                                            <p:strVal val="1+#ppt_h/2"/>
+                                          </p:val>
+                                        </p:tav>
+                                        <p:tav tm="100000">
+                                          <p:val>
+                                            <p:strVal val="#ppt_y"/>
+                                          </p:val>
+                                        </p:tav>
+                                      </p:tavLst>
+                                    </p:anim>
+                                  </p:childTnLst>
+                                </p:cTn>
+                              </p:par>
+                            </p:childTnLst>
+                          </p:cTn>
+                        </p:par>
+                      </p:childTnLst>
+                    </p:cTn>
+                  </p:par>
+                </p:childTnLst>
+              </p:cTn>
+              <p:prevCondLst>
+                <p:cond evt="onPrev" delay="0">
+                  <p:tgtEl>
+                    <p:sldTgt/>
+                  </p:tgtEl>
+                </p:cond>
+              </p:prevCondLst>
+              <p:nextCondLst>
+                <p:cond evt="onNext" delay="0">
+                  <p:tgtEl>
+                    <p:sldTgt/>
+                  </p:tgtEl>
+                </p:cond>
+              </p:nextCondLst>
+            </p:seq>
+          </p:childTnLst>
+        </p:cTn>
+      </p:par>
+    </p:tnLst>
+    <p:bldLst>
+      <p:bldP spid="3" grpId="0" build="p"/>
+    </p:bldLst>
+  </p:timing>
+</p:sld>
+</file>
+
+<file path=ppt/slides/slide5.xml><?xml version="1.0" encoding="utf-8"?>
+<p:sld xmlns:a="http://schemas.openxmlformats.org/drawingml/2006/main" xmlns:r="http://schemas.openxmlformats.org/officeDocument/2006/relationships" xmlns:p="http://schemas.openxmlformats.org/presentationml/2006/main">
+  <p:cSld>
+    <p:spTree>
+      <p:nvGrpSpPr>
+        <p:cNvPr id="1" name=""/>
+        <p:cNvGrpSpPr/>
+        <p:nvPr/>
+      </p:nvGrpSpPr>
+      <p:grpSpPr>
+        <a:xfrm>
+          <a:off x="0" y="0"/>
+          <a:ext cx="0" cy="0"/>
+          <a:chOff x="0" y="0"/>
+          <a:chExt cx="0" cy="0"/>
+        </a:xfrm>
+      </p:grpSpPr>
+      <p:sp>
+        <p:nvSpPr>
+          <p:cNvPr id="2" name="Title 1"/>
+          <p:cNvSpPr>
+            <a:spLocks noGrp="1"/>
+          </p:cNvSpPr>
+          <p:nvPr>
+            <p:ph type="title"/>
+          </p:nvPr>
+        </p:nvSpPr>
+        <p:spPr/>
+        <p:txBody>
+          <a:bodyPr>
+            <a:normAutofit/>
+          </a:bodyPr>
+          <a:lstStyle/>
+          <a:p>
+            <a:r>
+              <a:rPr lang="en-US" dirty="0"/>
               <a:t>Additional Functions</a:t>
             </a:r>
           </a:p>
@@ -9281,641 +10106,6 @@
                                           <p:spTgt spid="3">
                                             <p:txEl>
                                               <p:pRg st="6" end="6"/>
-                                            </p:txEl>
-                                          </p:spTgt>
-                                        </p:tgtEl>
-                                        <p:attrNameLst>
-                                          <p:attrName>ppt_y</p:attrName>
-                                        </p:attrNameLst>
-                                      </p:cBhvr>
-                                      <p:tavLst>
-                                        <p:tav tm="0">
-                                          <p:val>
-                                            <p:strVal val="1+#ppt_h/2"/>
-                                          </p:val>
-                                        </p:tav>
-                                        <p:tav tm="100000">
-                                          <p:val>
-                                            <p:strVal val="#ppt_y"/>
-                                          </p:val>
-                                        </p:tav>
-                                      </p:tavLst>
-                                    </p:anim>
-                                  </p:childTnLst>
-                                </p:cTn>
-                              </p:par>
-                            </p:childTnLst>
-                          </p:cTn>
-                        </p:par>
-                      </p:childTnLst>
-                    </p:cTn>
-                  </p:par>
-                </p:childTnLst>
-              </p:cTn>
-              <p:prevCondLst>
-                <p:cond evt="onPrev" delay="0">
-                  <p:tgtEl>
-                    <p:sldTgt/>
-                  </p:tgtEl>
-                </p:cond>
-              </p:prevCondLst>
-              <p:nextCondLst>
-                <p:cond evt="onNext" delay="0">
-                  <p:tgtEl>
-                    <p:sldTgt/>
-                  </p:tgtEl>
-                </p:cond>
-              </p:nextCondLst>
-            </p:seq>
-          </p:childTnLst>
-        </p:cTn>
-      </p:par>
-    </p:tnLst>
-    <p:bldLst>
-      <p:bldP spid="3" grpId="0" build="p"/>
-    </p:bldLst>
-  </p:timing>
-</p:sld>
-</file>
-
-<file path=ppt/slides/slide5.xml><?xml version="1.0" encoding="utf-8"?>
-<p:sld xmlns:a="http://schemas.openxmlformats.org/drawingml/2006/main" xmlns:r="http://schemas.openxmlformats.org/officeDocument/2006/relationships" xmlns:p="http://schemas.openxmlformats.org/presentationml/2006/main">
-  <p:cSld>
-    <p:spTree>
-      <p:nvGrpSpPr>
-        <p:cNvPr id="1" name=""/>
-        <p:cNvGrpSpPr/>
-        <p:nvPr/>
-      </p:nvGrpSpPr>
-      <p:grpSpPr>
-        <a:xfrm>
-          <a:off x="0" y="0"/>
-          <a:ext cx="0" cy="0"/>
-          <a:chOff x="0" y="0"/>
-          <a:chExt cx="0" cy="0"/>
-        </a:xfrm>
-      </p:grpSpPr>
-      <p:sp>
-        <p:nvSpPr>
-          <p:cNvPr id="2" name="Title 1"/>
-          <p:cNvSpPr>
-            <a:spLocks noGrp="1"/>
-          </p:cNvSpPr>
-          <p:nvPr>
-            <p:ph type="title"/>
-          </p:nvPr>
-        </p:nvSpPr>
-        <p:spPr/>
-        <p:txBody>
-          <a:bodyPr>
-            <a:normAutofit/>
-          </a:bodyPr>
-          <a:lstStyle/>
-          <a:p>
-            <a:r>
-              <a:rPr lang="en-US" dirty="0"/>
-              <a:t>Solution</a:t>
-            </a:r>
-          </a:p>
-        </p:txBody>
-      </p:sp>
-      <p:sp>
-        <p:nvSpPr>
-          <p:cNvPr id="3" name="Content Placeholder 2"/>
-          <p:cNvSpPr>
-            <a:spLocks noGrp="1"/>
-          </p:cNvSpPr>
-          <p:nvPr>
-            <p:ph idx="1"/>
-          </p:nvPr>
-        </p:nvSpPr>
-        <p:spPr>
-          <a:xfrm>
-            <a:off x="1295402" y="2547601"/>
-            <a:ext cx="9601196" cy="3318936"/>
-          </a:xfrm>
-        </p:spPr>
-        <p:txBody>
-          <a:bodyPr>
-            <a:normAutofit lnSpcReduction="10000"/>
-          </a:bodyPr>
-          <a:lstStyle/>
-          <a:p>
-            <a:r>
-              <a:rPr lang="en-US" dirty="0"/>
-              <a:t>Students feel intimidated to reach out to new people. </a:t>
-            </a:r>
-            <a:r>
-              <a:rPr lang="en-US" dirty="0">
-                <a:sym typeface="Wingdings" panose="05000000000000000000" pitchFamily="2" charset="2"/>
-              </a:rPr>
-              <a:t> Tag Up automatically groups them </a:t>
-            </a:r>
-            <a:r>
-              <a:rPr lang="en-US" dirty="0" smtClean="0">
-                <a:sym typeface="Wingdings" panose="05000000000000000000" pitchFamily="2" charset="2"/>
-              </a:rPr>
-              <a:t>up by info given </a:t>
-            </a:r>
-            <a:r>
-              <a:rPr lang="en-US" dirty="0">
-                <a:sym typeface="Wingdings" panose="05000000000000000000" pitchFamily="2" charset="2"/>
-              </a:rPr>
-              <a:t>and </a:t>
-            </a:r>
-            <a:r>
-              <a:rPr lang="en-US" dirty="0" smtClean="0">
-                <a:sym typeface="Wingdings" panose="05000000000000000000" pitchFamily="2" charset="2"/>
-              </a:rPr>
-              <a:t>figures out a perfect lunch </a:t>
-            </a:r>
-            <a:r>
-              <a:rPr lang="en-US" dirty="0">
-                <a:sym typeface="Wingdings" panose="05000000000000000000" pitchFamily="2" charset="2"/>
-              </a:rPr>
-              <a:t>meeting.</a:t>
-            </a:r>
-          </a:p>
-          <a:p>
-            <a:r>
-              <a:rPr lang="en-US" dirty="0">
-                <a:sym typeface="Wingdings" panose="05000000000000000000" pitchFamily="2" charset="2"/>
-              </a:rPr>
-              <a:t>Students are </a:t>
-            </a:r>
-            <a:r>
-              <a:rPr lang="en-US" dirty="0"/>
-              <a:t>reluctant to talk with strangers. </a:t>
-            </a:r>
-            <a:r>
-              <a:rPr lang="en-US" dirty="0">
-                <a:sym typeface="Wingdings" panose="05000000000000000000" pitchFamily="2" charset="2"/>
-              </a:rPr>
-              <a:t> Tag Up matches </a:t>
-            </a:r>
-            <a:r>
-              <a:rPr lang="en-US" dirty="0" smtClean="0">
-                <a:sym typeface="Wingdings" panose="05000000000000000000" pitchFamily="2" charset="2"/>
-              </a:rPr>
-              <a:t>students </a:t>
-            </a:r>
-            <a:r>
-              <a:rPr lang="en-US" dirty="0">
-                <a:sym typeface="Wingdings" panose="05000000000000000000" pitchFamily="2" charset="2"/>
-              </a:rPr>
-              <a:t>with people </a:t>
-            </a:r>
-            <a:r>
-              <a:rPr lang="en-US" dirty="0" smtClean="0">
-                <a:sym typeface="Wingdings" panose="05000000000000000000" pitchFamily="2" charset="2"/>
-              </a:rPr>
-              <a:t>that have </a:t>
-            </a:r>
-            <a:r>
-              <a:rPr lang="en-US" dirty="0">
-                <a:sym typeface="Wingdings" panose="05000000000000000000" pitchFamily="2" charset="2"/>
-              </a:rPr>
-              <a:t>common interests and </a:t>
-            </a:r>
-            <a:r>
-              <a:rPr lang="en-US" dirty="0" smtClean="0">
-                <a:sym typeface="Wingdings" panose="05000000000000000000" pitchFamily="2" charset="2"/>
-              </a:rPr>
-              <a:t>personalities.</a:t>
-            </a:r>
-            <a:endParaRPr lang="en-US" dirty="0">
-              <a:sym typeface="Wingdings" panose="05000000000000000000" pitchFamily="2" charset="2"/>
-            </a:endParaRPr>
-          </a:p>
-          <a:p>
-            <a:r>
-              <a:rPr lang="en-US" dirty="0">
-                <a:sym typeface="Wingdings" panose="05000000000000000000" pitchFamily="2" charset="2"/>
-              </a:rPr>
-              <a:t>Students are too busy.  Tag Up matches them based on free </a:t>
-            </a:r>
-            <a:r>
-              <a:rPr lang="en-US" dirty="0" smtClean="0">
-                <a:sym typeface="Wingdings" panose="05000000000000000000" pitchFamily="2" charset="2"/>
-              </a:rPr>
-              <a:t>time.</a:t>
-            </a:r>
-            <a:endParaRPr lang="en-US" dirty="0">
-              <a:sym typeface="Wingdings" panose="05000000000000000000" pitchFamily="2" charset="2"/>
-            </a:endParaRPr>
-          </a:p>
-          <a:p>
-            <a:r>
-              <a:rPr lang="en-US" dirty="0">
-                <a:sym typeface="Wingdings" panose="05000000000000000000" pitchFamily="2" charset="2"/>
-              </a:rPr>
-              <a:t>Lasting connections are what make a difference.  Tag Up encourages follow-up meetings.</a:t>
-            </a:r>
-            <a:endParaRPr lang="en-US" dirty="0"/>
-          </a:p>
-        </p:txBody>
-      </p:sp>
-    </p:spTree>
-    <p:extLst>
-      <p:ext uri="{BB962C8B-B14F-4D97-AF65-F5344CB8AC3E}">
-        <p14:creationId xmlns:p14="http://schemas.microsoft.com/office/powerpoint/2010/main" val="3478906943"/>
-      </p:ext>
-    </p:extLst>
-  </p:cSld>
-  <p:clrMapOvr>
-    <a:masterClrMapping/>
-  </p:clrMapOvr>
-  <p:timing>
-    <p:tnLst>
-      <p:par>
-        <p:cTn id="1" dur="indefinite" restart="never" nodeType="tmRoot">
-          <p:childTnLst>
-            <p:seq concurrent="1" nextAc="seek">
-              <p:cTn id="2" dur="indefinite" nodeType="mainSeq">
-                <p:childTnLst>
-                  <p:par>
-                    <p:cTn id="3" fill="hold">
-                      <p:stCondLst>
-                        <p:cond delay="indefinite"/>
-                      </p:stCondLst>
-                      <p:childTnLst>
-                        <p:par>
-                          <p:cTn id="4" fill="hold">
-                            <p:stCondLst>
-                              <p:cond delay="0"/>
-                            </p:stCondLst>
-                            <p:childTnLst>
-                              <p:par>
-                                <p:cTn id="5" presetID="2" presetClass="entr" presetSubtype="4" fill="hold" grpId="0" nodeType="clickEffect">
-                                  <p:stCondLst>
-                                    <p:cond delay="0"/>
-                                  </p:stCondLst>
-                                  <p:childTnLst>
-                                    <p:set>
-                                      <p:cBhvr>
-                                        <p:cTn id="6" dur="1" fill="hold">
-                                          <p:stCondLst>
-                                            <p:cond delay="0"/>
-                                          </p:stCondLst>
-                                        </p:cTn>
-                                        <p:tgtEl>
-                                          <p:spTgt spid="3">
-                                            <p:txEl>
-                                              <p:pRg st="0" end="0"/>
-                                            </p:txEl>
-                                          </p:spTgt>
-                                        </p:tgtEl>
-                                        <p:attrNameLst>
-                                          <p:attrName>style.visibility</p:attrName>
-                                        </p:attrNameLst>
-                                      </p:cBhvr>
-                                      <p:to>
-                                        <p:strVal val="visible"/>
-                                      </p:to>
-                                    </p:set>
-                                    <p:anim calcmode="lin" valueType="num">
-                                      <p:cBhvr additive="base">
-                                        <p:cTn id="7" dur="500" fill="hold"/>
-                                        <p:tgtEl>
-                                          <p:spTgt spid="3">
-                                            <p:txEl>
-                                              <p:pRg st="0" end="0"/>
-                                            </p:txEl>
-                                          </p:spTgt>
-                                        </p:tgtEl>
-                                        <p:attrNameLst>
-                                          <p:attrName>ppt_x</p:attrName>
-                                        </p:attrNameLst>
-                                      </p:cBhvr>
-                                      <p:tavLst>
-                                        <p:tav tm="0">
-                                          <p:val>
-                                            <p:strVal val="#ppt_x"/>
-                                          </p:val>
-                                        </p:tav>
-                                        <p:tav tm="100000">
-                                          <p:val>
-                                            <p:strVal val="#ppt_x"/>
-                                          </p:val>
-                                        </p:tav>
-                                      </p:tavLst>
-                                    </p:anim>
-                                    <p:anim calcmode="lin" valueType="num">
-                                      <p:cBhvr additive="base">
-                                        <p:cTn id="8" dur="500" fill="hold"/>
-                                        <p:tgtEl>
-                                          <p:spTgt spid="3">
-                                            <p:txEl>
-                                              <p:pRg st="0" end="0"/>
-                                            </p:txEl>
-                                          </p:spTgt>
-                                        </p:tgtEl>
-                                        <p:attrNameLst>
-                                          <p:attrName>ppt_y</p:attrName>
-                                        </p:attrNameLst>
-                                      </p:cBhvr>
-                                      <p:tavLst>
-                                        <p:tav tm="0">
-                                          <p:val>
-                                            <p:strVal val="1+#ppt_h/2"/>
-                                          </p:val>
-                                        </p:tav>
-                                        <p:tav tm="100000">
-                                          <p:val>
-                                            <p:strVal val="#ppt_y"/>
-                                          </p:val>
-                                        </p:tav>
-                                      </p:tavLst>
-                                    </p:anim>
-                                  </p:childTnLst>
-                                </p:cTn>
-                              </p:par>
-                            </p:childTnLst>
-                          </p:cTn>
-                        </p:par>
-                      </p:childTnLst>
-                    </p:cTn>
-                  </p:par>
-                  <p:par>
-                    <p:cTn id="9" fill="hold">
-                      <p:stCondLst>
-                        <p:cond delay="indefinite"/>
-                      </p:stCondLst>
-                      <p:childTnLst>
-                        <p:par>
-                          <p:cTn id="10" fill="hold">
-                            <p:stCondLst>
-                              <p:cond delay="0"/>
-                            </p:stCondLst>
-                            <p:childTnLst>
-                              <p:par>
-                                <p:cTn id="11" presetID="2" presetClass="entr" presetSubtype="4" fill="hold" grpId="0" nodeType="clickEffect">
-                                  <p:stCondLst>
-                                    <p:cond delay="0"/>
-                                  </p:stCondLst>
-                                  <p:childTnLst>
-                                    <p:set>
-                                      <p:cBhvr>
-                                        <p:cTn id="12" dur="1" fill="hold">
-                                          <p:stCondLst>
-                                            <p:cond delay="0"/>
-                                          </p:stCondLst>
-                                        </p:cTn>
-                                        <p:tgtEl>
-                                          <p:spTgt spid="3">
-                                            <p:txEl>
-                                              <p:pRg st="1" end="1"/>
-                                            </p:txEl>
-                                          </p:spTgt>
-                                        </p:tgtEl>
-                                        <p:attrNameLst>
-                                          <p:attrName>style.visibility</p:attrName>
-                                        </p:attrNameLst>
-                                      </p:cBhvr>
-                                      <p:to>
-                                        <p:strVal val="visible"/>
-                                      </p:to>
-                                    </p:set>
-                                    <p:anim calcmode="lin" valueType="num">
-                                      <p:cBhvr additive="base">
-                                        <p:cTn id="13" dur="500" fill="hold"/>
-                                        <p:tgtEl>
-                                          <p:spTgt spid="3">
-                                            <p:txEl>
-                                              <p:pRg st="1" end="1"/>
-                                            </p:txEl>
-                                          </p:spTgt>
-                                        </p:tgtEl>
-                                        <p:attrNameLst>
-                                          <p:attrName>ppt_x</p:attrName>
-                                        </p:attrNameLst>
-                                      </p:cBhvr>
-                                      <p:tavLst>
-                                        <p:tav tm="0">
-                                          <p:val>
-                                            <p:strVal val="#ppt_x"/>
-                                          </p:val>
-                                        </p:tav>
-                                        <p:tav tm="100000">
-                                          <p:val>
-                                            <p:strVal val="#ppt_x"/>
-                                          </p:val>
-                                        </p:tav>
-                                      </p:tavLst>
-                                    </p:anim>
-                                    <p:anim calcmode="lin" valueType="num">
-                                      <p:cBhvr additive="base">
-                                        <p:cTn id="14" dur="500" fill="hold"/>
-                                        <p:tgtEl>
-                                          <p:spTgt spid="3">
-                                            <p:txEl>
-                                              <p:pRg st="1" end="1"/>
-                                            </p:txEl>
-                                          </p:spTgt>
-                                        </p:tgtEl>
-                                        <p:attrNameLst>
-                                          <p:attrName>ppt_y</p:attrName>
-                                        </p:attrNameLst>
-                                      </p:cBhvr>
-                                      <p:tavLst>
-                                        <p:tav tm="0">
-                                          <p:val>
-                                            <p:strVal val="1+#ppt_h/2"/>
-                                          </p:val>
-                                        </p:tav>
-                                        <p:tav tm="100000">
-                                          <p:val>
-                                            <p:strVal val="#ppt_y"/>
-                                          </p:val>
-                                        </p:tav>
-                                      </p:tavLst>
-                                    </p:anim>
-                                  </p:childTnLst>
-                                </p:cTn>
-                              </p:par>
-                            </p:childTnLst>
-                          </p:cTn>
-                        </p:par>
-                      </p:childTnLst>
-                    </p:cTn>
-                  </p:par>
-                  <p:par>
-                    <p:cTn id="15" fill="hold">
-                      <p:stCondLst>
-                        <p:cond delay="indefinite"/>
-                      </p:stCondLst>
-                      <p:childTnLst>
-                        <p:par>
-                          <p:cTn id="16" fill="hold">
-                            <p:stCondLst>
-                              <p:cond delay="0"/>
-                            </p:stCondLst>
-                            <p:childTnLst>
-                              <p:par>
-                                <p:cTn id="17" presetID="2" presetClass="entr" presetSubtype="4" fill="hold" grpId="0" nodeType="clickEffect">
-                                  <p:stCondLst>
-                                    <p:cond delay="0"/>
-                                  </p:stCondLst>
-                                  <p:childTnLst>
-                                    <p:set>
-                                      <p:cBhvr>
-                                        <p:cTn id="18" dur="1" fill="hold">
-                                          <p:stCondLst>
-                                            <p:cond delay="0"/>
-                                          </p:stCondLst>
-                                        </p:cTn>
-                                        <p:tgtEl>
-                                          <p:spTgt spid="3">
-                                            <p:txEl>
-                                              <p:pRg st="2" end="2"/>
-                                            </p:txEl>
-                                          </p:spTgt>
-                                        </p:tgtEl>
-                                        <p:attrNameLst>
-                                          <p:attrName>style.visibility</p:attrName>
-                                        </p:attrNameLst>
-                                      </p:cBhvr>
-                                      <p:to>
-                                        <p:strVal val="visible"/>
-                                      </p:to>
-                                    </p:set>
-                                    <p:anim calcmode="lin" valueType="num">
-                                      <p:cBhvr additive="base">
-                                        <p:cTn id="19" dur="500" fill="hold"/>
-                                        <p:tgtEl>
-                                          <p:spTgt spid="3">
-                                            <p:txEl>
-                                              <p:pRg st="2" end="2"/>
-                                            </p:txEl>
-                                          </p:spTgt>
-                                        </p:tgtEl>
-                                        <p:attrNameLst>
-                                          <p:attrName>ppt_x</p:attrName>
-                                        </p:attrNameLst>
-                                      </p:cBhvr>
-                                      <p:tavLst>
-                                        <p:tav tm="0">
-                                          <p:val>
-                                            <p:strVal val="#ppt_x"/>
-                                          </p:val>
-                                        </p:tav>
-                                        <p:tav tm="100000">
-                                          <p:val>
-                                            <p:strVal val="#ppt_x"/>
-                                          </p:val>
-                                        </p:tav>
-                                      </p:tavLst>
-                                    </p:anim>
-                                    <p:anim calcmode="lin" valueType="num">
-                                      <p:cBhvr additive="base">
-                                        <p:cTn id="20" dur="500" fill="hold"/>
-                                        <p:tgtEl>
-                                          <p:spTgt spid="3">
-                                            <p:txEl>
-                                              <p:pRg st="2" end="2"/>
-                                            </p:txEl>
-                                          </p:spTgt>
-                                        </p:tgtEl>
-                                        <p:attrNameLst>
-                                          <p:attrName>ppt_y</p:attrName>
-                                        </p:attrNameLst>
-                                      </p:cBhvr>
-                                      <p:tavLst>
-                                        <p:tav tm="0">
-                                          <p:val>
-                                            <p:strVal val="1+#ppt_h/2"/>
-                                          </p:val>
-                                        </p:tav>
-                                        <p:tav tm="100000">
-                                          <p:val>
-                                            <p:strVal val="#ppt_y"/>
-                                          </p:val>
-                                        </p:tav>
-                                      </p:tavLst>
-                                    </p:anim>
-                                  </p:childTnLst>
-                                </p:cTn>
-                              </p:par>
-                            </p:childTnLst>
-                          </p:cTn>
-                        </p:par>
-                      </p:childTnLst>
-                    </p:cTn>
-                  </p:par>
-                  <p:par>
-                    <p:cTn id="21" fill="hold">
-                      <p:stCondLst>
-                        <p:cond delay="indefinite"/>
-                      </p:stCondLst>
-                      <p:childTnLst>
-                        <p:par>
-                          <p:cTn id="22" fill="hold">
-                            <p:stCondLst>
-                              <p:cond delay="0"/>
-                            </p:stCondLst>
-                            <p:childTnLst>
-                              <p:par>
-                                <p:cTn id="23" presetID="2" presetClass="entr" presetSubtype="4" fill="hold" grpId="0" nodeType="clickEffect">
-                                  <p:stCondLst>
-                                    <p:cond delay="0"/>
-                                  </p:stCondLst>
-                                  <p:childTnLst>
-                                    <p:set>
-                                      <p:cBhvr>
-                                        <p:cTn id="24" dur="1" fill="hold">
-                                          <p:stCondLst>
-                                            <p:cond delay="0"/>
-                                          </p:stCondLst>
-                                        </p:cTn>
-                                        <p:tgtEl>
-                                          <p:spTgt spid="3">
-                                            <p:txEl>
-                                              <p:pRg st="3" end="3"/>
-                                            </p:txEl>
-                                          </p:spTgt>
-                                        </p:tgtEl>
-                                        <p:attrNameLst>
-                                          <p:attrName>style.visibility</p:attrName>
-                                        </p:attrNameLst>
-                                      </p:cBhvr>
-                                      <p:to>
-                                        <p:strVal val="visible"/>
-                                      </p:to>
-                                    </p:set>
-                                    <p:anim calcmode="lin" valueType="num">
-                                      <p:cBhvr additive="base">
-                                        <p:cTn id="25" dur="500" fill="hold"/>
-                                        <p:tgtEl>
-                                          <p:spTgt spid="3">
-                                            <p:txEl>
-                                              <p:pRg st="3" end="3"/>
-                                            </p:txEl>
-                                          </p:spTgt>
-                                        </p:tgtEl>
-                                        <p:attrNameLst>
-                                          <p:attrName>ppt_x</p:attrName>
-                                        </p:attrNameLst>
-                                      </p:cBhvr>
-                                      <p:tavLst>
-                                        <p:tav tm="0">
-                                          <p:val>
-                                            <p:strVal val="#ppt_x"/>
-                                          </p:val>
-                                        </p:tav>
-                                        <p:tav tm="100000">
-                                          <p:val>
-                                            <p:strVal val="#ppt_x"/>
-                                          </p:val>
-                                        </p:tav>
-                                      </p:tavLst>
-                                    </p:anim>
-                                    <p:anim calcmode="lin" valueType="num">
-                                      <p:cBhvr additive="base">
-                                        <p:cTn id="26" dur="500" fill="hold"/>
-                                        <p:tgtEl>
-                                          <p:spTgt spid="3">
-                                            <p:txEl>
-                                              <p:pRg st="3" end="3"/>
                                             </p:txEl>
                                           </p:spTgt>
                                         </p:tgtEl>

</xml_diff>